<commit_message>
crop image in readme
</commit_message>
<xml_diff>
--- a/Credit_Risk_Methodology.pptx
+++ b/Credit_Risk_Methodology.pptx
@@ -7,7 +7,8 @@
   <p:sldIdLst>
     <p:sldId id="256" r:id="rId2"/>
     <p:sldId id="257" r:id="rId3"/>
-    <p:sldId id="258" r:id="rId4"/>
+    <p:sldId id="259" r:id="rId4"/>
+    <p:sldId id="258" r:id="rId5"/>
   </p:sldIdLst>
   <p:sldSz cx="12192000" cy="6858000"/>
   <p:notesSz cx="6858000" cy="9144000"/>
@@ -106,6 +107,11 @@
       </a:defRPr>
     </a:lvl9pPr>
   </p:defaultTextStyle>
+  <p:extLst>
+    <p:ext uri="{EFAFB233-063F-42B5-8137-9DF3F51BA10A}">
+      <p15:sldGuideLst xmlns:p15="http://schemas.microsoft.com/office/powerpoint/2012/main"/>
+    </p:ext>
+  </p:extLst>
 </p:presentation>
 </file>
 
@@ -3460,6 +3466,71 @@
           <p:cNvPr id="5" name="Picture 4">
             <a:extLst>
               <a:ext uri="{FF2B5EF4-FFF2-40B4-BE49-F238E27FC236}">
+                <a16:creationId xmlns:a16="http://schemas.microsoft.com/office/drawing/2014/main" id="{CF6979E2-ED93-4143-9DBA-8A371B622821}"/>
+              </a:ext>
+            </a:extLst>
+          </p:cNvPr>
+          <p:cNvPicPr>
+            <a:picLocks noChangeAspect="1"/>
+          </p:cNvPicPr>
+          <p:nvPr/>
+        </p:nvPicPr>
+        <p:blipFill rotWithShape="1">
+          <a:blip r:embed="rId2">
+            <a:extLst>
+              <a:ext uri="{28A0092B-C50C-407E-A947-70E740481C1C}">
+                <a14:useLocalDpi xmlns:a14="http://schemas.microsoft.com/office/drawing/2010/main" val="0"/>
+              </a:ext>
+            </a:extLst>
+          </a:blip>
+          <a:srcRect l="643" t="866"/>
+          <a:stretch/>
+        </p:blipFill>
+        <p:spPr>
+          <a:xfrm>
+            <a:off x="78376" y="60960"/>
+            <a:ext cx="12113623" cy="6795404"/>
+          </a:xfrm>
+          <a:prstGeom prst="rect">
+            <a:avLst/>
+          </a:prstGeom>
+        </p:spPr>
+      </p:pic>
+    </p:spTree>
+    <p:extLst>
+      <p:ext uri="{BB962C8B-B14F-4D97-AF65-F5344CB8AC3E}">
+        <p14:creationId xmlns:p14="http://schemas.microsoft.com/office/powerpoint/2010/main" val="645684823"/>
+      </p:ext>
+    </p:extLst>
+  </p:cSld>
+  <p:clrMapOvr>
+    <a:masterClrMapping/>
+  </p:clrMapOvr>
+</p:sld>
+</file>
+
+<file path=ppt/slides/slide4.xml><?xml version="1.0" encoding="utf-8"?>
+<p:sld xmlns:a="http://schemas.openxmlformats.org/drawingml/2006/main" xmlns:r="http://schemas.openxmlformats.org/officeDocument/2006/relationships" xmlns:p="http://schemas.openxmlformats.org/presentationml/2006/main">
+  <p:cSld>
+    <p:spTree>
+      <p:nvGrpSpPr>
+        <p:cNvPr id="1" name=""/>
+        <p:cNvGrpSpPr/>
+        <p:nvPr/>
+      </p:nvGrpSpPr>
+      <p:grpSpPr>
+        <a:xfrm>
+          <a:off x="0" y="0"/>
+          <a:ext cx="0" cy="0"/>
+          <a:chOff x="0" y="0"/>
+          <a:chExt cx="0" cy="0"/>
+        </a:xfrm>
+      </p:grpSpPr>
+      <p:pic>
+        <p:nvPicPr>
+          <p:cNvPr id="5" name="Picture 4">
+            <a:extLst>
+              <a:ext uri="{FF2B5EF4-FFF2-40B4-BE49-F238E27FC236}">
                 <a16:creationId xmlns:a16="http://schemas.microsoft.com/office/drawing/2014/main" id="{B1E3F316-4C72-4E33-9C03-206D7DC9B118}"/>
               </a:ext>
             </a:extLst>

</xml_diff>